<commit_message>
Rearrange files and folders.
</commit_message>
<xml_diff>
--- a/Python Advanced Module/Python Advanced Course/03. Multidimensional Lists/Multidimensional Lists.pptx
+++ b/Python Advanced Module/Python Advanced Course/03. Multidimensional Lists/Multidimensional Lists.pptx
@@ -229,6 +229,35 @@
 </p:presentation>
 </file>
 
+<file path=ppt/changesInfos/changesInfo1.xml><?xml version="1.0" encoding="utf-8"?>
+<pc:chgInfo xmlns:a="http://schemas.openxmlformats.org/drawingml/2006/main" xmlns:r="http://schemas.openxmlformats.org/officeDocument/2006/relationships" xmlns:ac="http://schemas.microsoft.com/office/drawing/2013/main/command" xmlns:pc="http://schemas.microsoft.com/office/powerpoint/2013/main/command">
+  <pc:docChgLst>
+    <pc:chgData name="Nikolay Skomorohov" userId="a997344a2df8839f" providerId="LiveId" clId="{B768F013-4399-4683-90AD-567F9B1E5CE7}"/>
+    <pc:docChg chg="modSld">
+      <pc:chgData name="Nikolay Skomorohov" userId="a997344a2df8839f" providerId="LiveId" clId="{B768F013-4399-4683-90AD-567F9B1E5CE7}" dt="2020-01-26T19:19:07.768" v="0" actId="1076"/>
+      <pc:docMkLst>
+        <pc:docMk/>
+      </pc:docMkLst>
+      <pc:sldChg chg="modSp">
+        <pc:chgData name="Nikolay Skomorohov" userId="a997344a2df8839f" providerId="LiveId" clId="{B768F013-4399-4683-90AD-567F9B1E5CE7}" dt="2020-01-26T19:19:07.768" v="0" actId="1076"/>
+        <pc:sldMkLst>
+          <pc:docMk/>
+          <pc:sldMk cId="4186164216" sldId="309"/>
+        </pc:sldMkLst>
+        <pc:spChg chg="mod">
+          <ac:chgData name="Nikolay Skomorohov" userId="a997344a2df8839f" providerId="LiveId" clId="{B768F013-4399-4683-90AD-567F9B1E5CE7}" dt="2020-01-26T19:19:07.768" v="0" actId="1076"/>
+          <ac:spMkLst>
+            <pc:docMk/>
+            <pc:sldMk cId="4186164216" sldId="309"/>
+            <ac:spMk id="7" creationId="{15A2340E-60DE-410C-AF00-45EDB054BCC7}"/>
+          </ac:spMkLst>
+        </pc:spChg>
+      </pc:sldChg>
+    </pc:docChg>
+  </pc:docChgLst>
+</pc:chgInfo>
+</file>
+
 <file path=ppt/handoutMasters/handoutMaster1.xml><?xml version="1.0" encoding="utf-8"?>
 <p:handoutMaster xmlns:a="http://schemas.openxmlformats.org/drawingml/2006/main" xmlns:r="http://schemas.openxmlformats.org/officeDocument/2006/relationships" xmlns:p="http://schemas.openxmlformats.org/presentationml/2006/main">
   <p:cSld>
@@ -323,7 +352,7 @@
           <a:p>
             <a:fld id="{4E087215-0C8F-4762-A664-737A353EC9A4}" type="datetimeFigureOut">
               <a:rPr lang="bg-BG" smtClean="0"/>
-              <a:t>22.1.2020 г.</a:t>
+              <a:t>26.1.2020 г.</a:t>
             </a:fld>
             <a:endParaRPr lang="bg-BG"/>
           </a:p>
@@ -514,7 +543,7 @@
           <a:p>
             <a:fld id="{72D84649-876A-46C9-8472-14CB09C070D8}" type="datetimeFigureOut">
               <a:rPr lang="en-US" smtClean="0"/>
-              <a:t>1/22/2020</a:t>
+              <a:t>26-Jan-20</a:t>
             </a:fld>
             <a:endParaRPr lang="en-US"/>
           </a:p>
@@ -3580,7 +3609,7 @@
                 <a:hlinkClick r:id="rId2">
                   <a:extLst>
                     <a:ext uri="{A12FA001-AC4F-418D-AE19-62706E023703}">
-                      <ahyp:hlinkClr xmlns="" xmlns:ahyp="http://schemas.microsoft.com/office/drawing/2018/hyperlinkcolor" val="tx"/>
+                      <ahyp:hlinkClr xmlns:ahyp="http://schemas.microsoft.com/office/drawing/2018/hyperlinkcolor" val="tx"/>
                     </a:ext>
                   </a:extLst>
                 </a:hlinkClick>
@@ -8558,13 +8587,6 @@
   <p:clrMapOvr>
     <a:masterClrMapping/>
   </p:clrMapOvr>
-  <p:timing>
-    <p:tnLst>
-      <p:par>
-        <p:cTn id="1" dur="indefinite" restart="never" nodeType="tmRoot"/>
-      </p:par>
-    </p:tnLst>
-  </p:timing>
 </p:sld>
 </file>
 
@@ -8640,12 +8662,8 @@
               <a:buChar char="§"/>
             </a:pPr>
             <a:r>
-              <a:rPr lang="en-US" sz="3200" dirty="0" smtClean="0"/>
-              <a:t>Sum </a:t>
-            </a:r>
-            <a:r>
               <a:rPr lang="en-US" sz="3200" dirty="0"/>
-              <a:t>of all </a:t>
+              <a:t>Sum of all </a:t>
             </a:r>
             <a:r>
               <a:rPr lang="en-US" sz="3200" b="1" dirty="0">
@@ -8655,11 +8673,6 @@
               </a:rPr>
               <a:t>matrix elements </a:t>
             </a:r>
-            <a:endParaRPr lang="en-US" sz="3200" b="1" dirty="0" smtClean="0">
-              <a:solidFill>
-                <a:schemeClr val="bg1"/>
-              </a:solidFill>
-            </a:endParaRPr>
           </a:p>
           <a:p>
             <a:pPr marL="1066419" lvl="1" indent="-457200" fontAlgn="base">
@@ -8668,25 +8681,16 @@
             </a:pPr>
             <a:r>
               <a:rPr lang="en-US" sz="3200" dirty="0"/>
-              <a:t>T</a:t>
-            </a:r>
-            <a:r>
-              <a:rPr lang="en-US" sz="3200" dirty="0" smtClean="0"/>
-              <a:t>he </a:t>
-            </a:r>
-            <a:r>
-              <a:rPr lang="en-US" sz="3200" b="1" dirty="0" smtClean="0">
+              <a:t>The </a:t>
+            </a:r>
+            <a:r>
+              <a:rPr lang="en-US" sz="3200" b="1" dirty="0">
                 <a:solidFill>
                   <a:schemeClr val="bg1"/>
                 </a:solidFill>
               </a:rPr>
               <a:t>matrix</a:t>
             </a:r>
-            <a:endParaRPr lang="en-US" sz="3200" b="1" dirty="0">
-              <a:solidFill>
-                <a:schemeClr val="bg1"/>
-              </a:solidFill>
-            </a:endParaRPr>
           </a:p>
           <a:p>
             <a:pPr marL="457200" indent="-457200" fontAlgn="base">
@@ -8789,13 +8793,8 @@
           <a:p>
             <a:r>
               <a:rPr lang="bg-BG" dirty="0"/>
-              <a:t>4, 6, 7, 9, 1, </a:t>
-            </a:r>
-            <a:r>
-              <a:rPr lang="bg-BG" dirty="0" smtClean="0"/>
-              <a:t>0</a:t>
-            </a:r>
-            <a:endParaRPr lang="bg-BG" dirty="0"/>
+              <a:t>4, 6, 7, 9, 1, 0</a:t>
+            </a:r>
           </a:p>
         </p:txBody>
       </p:sp>
@@ -9640,7 +9639,7 @@
         </p:nvSpPr>
         <p:spPr>
           <a:xfrm>
-            <a:off x="1753769" y="1386775"/>
+            <a:off x="1470965" y="1782701"/>
             <a:ext cx="8684461" cy="3908222"/>
           </a:xfrm>
           <a:prstGeom prst="rect">
@@ -10015,15 +10014,7 @@
                   <a:schemeClr val="tx1"/>
                 </a:solidFill>
               </a:rPr>
-              <a:t> = </a:t>
-            </a:r>
-            <a:r>
-              <a:rPr lang="en-US" dirty="0" smtClean="0">
-                <a:solidFill>
-                  <a:schemeClr val="tx1"/>
-                </a:solidFill>
-              </a:rPr>
-              <a:t>lines</a:t>
+              <a:t> = lines</a:t>
             </a:r>
           </a:p>
           <a:p>
@@ -10051,7 +10042,7 @@
               </a:spcAft>
             </a:pPr>
             <a:r>
-              <a:rPr lang="en-US" i="1" dirty="0" smtClean="0">
+              <a:rPr lang="en-US" i="1" dirty="0">
                 <a:solidFill>
                   <a:schemeClr val="accent2"/>
                 </a:solidFill>
@@ -10069,18 +10060,13 @@
               </a:spcAft>
             </a:pPr>
             <a:r>
-              <a:rPr lang="en-US" i="1" dirty="0" smtClean="0">
+              <a:rPr lang="en-US" i="1" dirty="0">
                 <a:solidFill>
                   <a:schemeClr val="accent2"/>
                 </a:solidFill>
               </a:rPr>
               <a:t># Print the matrix</a:t>
             </a:r>
-            <a:endParaRPr lang="en-US" i="1" dirty="0">
-              <a:solidFill>
-                <a:schemeClr val="accent2"/>
-              </a:solidFill>
-            </a:endParaRPr>
           </a:p>
         </p:txBody>
       </p:sp>
@@ -10329,13 +10315,6 @@
       <p:transition spd="slow" advClick="0" advTm="5000"/>
     </mc:Fallback>
   </mc:AlternateContent>
-  <p:timing>
-    <p:tnLst>
-      <p:par>
-        <p:cTn id="1" dur="indefinite" restart="never" nodeType="tmRoot"/>
-      </p:par>
-    </p:tnLst>
-  </p:timing>
 </p:sld>
 </file>
 
@@ -11844,11 +11823,7 @@
             </a:pPr>
             <a:r>
               <a:rPr lang="en-US" dirty="0"/>
-              <a:t>Using comprehension to traverse multidimensional </a:t>
-            </a:r>
-            <a:r>
-              <a:rPr lang="en-US" dirty="0" smtClean="0"/>
-              <a:t>lists</a:t>
+              <a:t>Using comprehension to traverse multidimensional lists</a:t>
             </a:r>
           </a:p>
           <a:p>
@@ -11863,7 +11838,7 @@
               <a:buFont typeface="Wingdings" panose="05000000000000000000" pitchFamily="2" charset="2"/>
               <a:buChar char="§"/>
             </a:pPr>
-            <a:endParaRPr lang="en-US" dirty="0" smtClean="0"/>
+            <a:endParaRPr lang="en-US" dirty="0"/>
           </a:p>
           <a:p>
             <a:pPr marL="457200" indent="-457200">
@@ -11878,11 +11853,11 @@
               <a:buChar char="§"/>
             </a:pPr>
             <a:r>
-              <a:rPr lang="en-US" dirty="0" smtClean="0"/>
+              <a:rPr lang="en-US" dirty="0"/>
               <a:t>It is </a:t>
             </a:r>
             <a:r>
-              <a:rPr lang="en-US" b="1" dirty="0" smtClean="0">
+              <a:rPr lang="en-US" b="1" dirty="0">
                 <a:solidFill>
                   <a:schemeClr val="bg1"/>
                 </a:solidFill>
@@ -11890,25 +11865,25 @@
               <a:t>bad practice </a:t>
             </a:r>
             <a:r>
-              <a:rPr lang="en-US" dirty="0" smtClean="0"/>
+              <a:rPr lang="en-US" dirty="0"/>
               <a:t>to use comprehensions for</a:t>
             </a:r>
             <a:br>
-              <a:rPr lang="en-US" dirty="0" smtClean="0"/>
+              <a:rPr lang="en-US" dirty="0"/>
             </a:br>
             <a:r>
-              <a:rPr lang="en-US" dirty="0" smtClean="0"/>
+              <a:rPr lang="en-US" dirty="0"/>
               <a:t>multidimensional lists, since the code</a:t>
             </a:r>
             <a:br>
-              <a:rPr lang="en-US" dirty="0" smtClean="0"/>
+              <a:rPr lang="en-US" dirty="0"/>
             </a:br>
             <a:r>
-              <a:rPr lang="en-US" dirty="0" smtClean="0"/>
+              <a:rPr lang="en-US" dirty="0"/>
               <a:t>becomes </a:t>
             </a:r>
             <a:r>
-              <a:rPr lang="en-US" b="1" dirty="0" smtClean="0">
+              <a:rPr lang="en-US" b="1" dirty="0">
                 <a:solidFill>
                   <a:schemeClr val="bg1"/>
                 </a:solidFill>
@@ -11916,11 +11891,11 @@
               <a:t>messy</a:t>
             </a:r>
             <a:r>
-              <a:rPr lang="en-US" dirty="0" smtClean="0"/>
+              <a:rPr lang="en-US" dirty="0"/>
               <a:t> and </a:t>
             </a:r>
             <a:r>
-              <a:rPr lang="en-US" b="1" dirty="0" smtClean="0">
+              <a:rPr lang="en-US" b="1" dirty="0">
                 <a:solidFill>
                   <a:schemeClr val="bg1"/>
                 </a:solidFill>
@@ -14873,17 +14848,12 @@
             <a:pPr lvl="1"/>
             <a:r>
               <a:rPr lang="en-US" dirty="0"/>
-              <a:t>Change </a:t>
-            </a:r>
-            <a:r>
-              <a:rPr lang="en-US" dirty="0" smtClean="0"/>
-              <a:t>values</a:t>
-            </a:r>
-            <a:endParaRPr lang="en-US" dirty="0"/>
-          </a:p>
-          <a:p>
-            <a:r>
-              <a:rPr lang="en-US" dirty="0" smtClean="0"/>
+              <a:t>Change values</a:t>
+            </a:r>
+          </a:p>
+          <a:p>
+            <a:r>
+              <a:rPr lang="en-US" dirty="0"/>
               <a:t>Other nested structures</a:t>
             </a:r>
           </a:p>
@@ -18663,7 +18633,7 @@
           <a:lstStyle/>
           <a:p>
             <a:r>
-              <a:rPr lang="en-US" dirty="0" smtClean="0"/>
+              <a:rPr lang="en-US" dirty="0"/>
               <a:t>Sets in Lists, Lists and Sets as Dictionary Values</a:t>
             </a:r>
             <a:endParaRPr lang="bg-BG" dirty="0"/>
@@ -18686,7 +18656,7 @@
           <a:lstStyle/>
           <a:p>
             <a:r>
-              <a:rPr lang="en-US" dirty="0" smtClean="0"/>
+              <a:rPr lang="en-US" dirty="0"/>
               <a:t>Other Nested Structures</a:t>
             </a:r>
             <a:endParaRPr lang="bg-BG" dirty="0"/>
@@ -18773,13 +18743,6 @@
       <p:transition spd="slow" advClick="0" advTm="5000"/>
     </mc:Fallback>
   </mc:AlternateContent>
-  <p:timing>
-    <p:tnLst>
-      <p:par>
-        <p:cTn id="1" dur="indefinite" restart="never" nodeType="tmRoot"/>
-      </p:par>
-    </p:tnLst>
-  </p:timing>
 </p:sld>
 </file>
 
@@ -18820,7 +18783,7 @@
               <a:buChar char="§"/>
             </a:pPr>
             <a:r>
-              <a:rPr lang="en-US" dirty="0" smtClean="0"/>
+              <a:rPr lang="en-US" dirty="0"/>
               <a:t>We can also have sets inside of lists</a:t>
             </a:r>
           </a:p>
@@ -18836,7 +18799,7 @@
               <a:buFont typeface="Wingdings" panose="05000000000000000000" pitchFamily="2" charset="2"/>
               <a:buChar char="§"/>
             </a:pPr>
-            <a:endParaRPr lang="en-US" dirty="0" smtClean="0"/>
+            <a:endParaRPr lang="en-US" dirty="0"/>
           </a:p>
           <a:p>
             <a:pPr marL="457200" indent="-457200">
@@ -18851,7 +18814,7 @@
               <a:buChar char="§"/>
             </a:pPr>
             <a:r>
-              <a:rPr lang="en-US" dirty="0" smtClean="0"/>
+              <a:rPr lang="en-US" dirty="0"/>
               <a:t>or tuples in lists</a:t>
             </a:r>
           </a:p>
@@ -18867,7 +18830,7 @@
               <a:buFont typeface="Wingdings" panose="05000000000000000000" pitchFamily="2" charset="2"/>
               <a:buChar char="§"/>
             </a:pPr>
-            <a:endParaRPr lang="en-US" dirty="0" smtClean="0"/>
+            <a:endParaRPr lang="en-US" dirty="0"/>
           </a:p>
           <a:p>
             <a:pPr marL="457200" indent="-457200">
@@ -18899,38 +18862,29 @@
           <a:lstStyle/>
           <a:p>
             <a:r>
-              <a:rPr lang="en-US" dirty="0" err="1" smtClean="0"/>
+              <a:rPr lang="en-US" dirty="0" err="1"/>
               <a:t>sets_of_numbers</a:t>
             </a:r>
             <a:r>
-              <a:rPr lang="en-US" dirty="0" smtClean="0"/>
+              <a:rPr lang="en-US" dirty="0"/>
               <a:t> = [</a:t>
             </a:r>
           </a:p>
           <a:p>
             <a:r>
               <a:rPr lang="en-US" dirty="0"/>
-              <a:t> </a:t>
-            </a:r>
-            <a:r>
-              <a:rPr lang="en-US" dirty="0" smtClean="0"/>
-              <a:t>   {1, 2, 3},</a:t>
+              <a:t>    {1, 2, 3},</a:t>
             </a:r>
           </a:p>
           <a:p>
             <a:r>
               <a:rPr lang="en-US" dirty="0"/>
-              <a:t> </a:t>
-            </a:r>
-            <a:r>
-              <a:rPr lang="en-US" dirty="0" smtClean="0"/>
-              <a:t>   {3, 4, 5}</a:t>
-            </a:r>
-            <a:endParaRPr lang="en-US" dirty="0"/>
-          </a:p>
-          <a:p>
-            <a:r>
-              <a:rPr lang="en-US" dirty="0" smtClean="0"/>
+              <a:t>    {3, 4, 5}</a:t>
+            </a:r>
+          </a:p>
+          <a:p>
+            <a:r>
+              <a:rPr lang="en-US" dirty="0"/>
               <a:t>]</a:t>
             </a:r>
             <a:endParaRPr lang="bg-BG" dirty="0"/>
@@ -18953,7 +18907,7 @@
           <a:lstStyle/>
           <a:p>
             <a:r>
-              <a:rPr lang="en-US" dirty="0" smtClean="0"/>
+              <a:rPr lang="en-US" dirty="0"/>
               <a:t>Nested Structures</a:t>
             </a:r>
             <a:endParaRPr lang="bg-BG" dirty="0"/>
@@ -19164,40 +19118,39 @@
           </a:lstStyle>
           <a:p>
             <a:r>
-              <a:rPr lang="en-US" dirty="0" err="1" smtClean="0"/>
+              <a:rPr lang="en-US" dirty="0" err="1"/>
               <a:t>tuples_collection</a:t>
             </a:r>
             <a:r>
-              <a:rPr lang="en-US" dirty="0" smtClean="0"/>
+              <a:rPr lang="en-US" dirty="0"/>
               <a:t> = [</a:t>
             </a:r>
           </a:p>
           <a:p>
             <a:r>
-              <a:rPr lang="en-US" dirty="0" smtClean="0"/>
+              <a:rPr lang="en-US" dirty="0"/>
               <a:t>    ("peter", "</a:t>
             </a:r>
             <a:r>
-              <a:rPr lang="en-US" dirty="0" err="1" smtClean="0"/>
+              <a:rPr lang="en-US" dirty="0" err="1"/>
               <a:t>mary</a:t>
             </a:r>
             <a:r>
-              <a:rPr lang="en-US" dirty="0" smtClean="0"/>
+              <a:rPr lang="en-US" dirty="0"/>
               <a:t>"),</a:t>
             </a:r>
           </a:p>
           <a:p>
             <a:r>
-              <a:rPr lang="en-US" dirty="0" smtClean="0"/>
+              <a:rPr lang="en-US" dirty="0"/>
               <a:t>    (22, 19)</a:t>
             </a:r>
           </a:p>
           <a:p>
             <a:r>
-              <a:rPr lang="en-US" dirty="0" smtClean="0"/>
+              <a:rPr lang="en-US" dirty="0"/>
               <a:t>]</a:t>
             </a:r>
-            <a:endParaRPr lang="en-US" dirty="0"/>
           </a:p>
         </p:txBody>
       </p:sp>
@@ -19570,7 +19523,7 @@
               <a:buChar char="§"/>
             </a:pPr>
             <a:r>
-              <a:rPr lang="en-US" dirty="0" smtClean="0"/>
+              <a:rPr lang="en-US" dirty="0"/>
               <a:t>We can also quite often have lists as dictionary values</a:t>
             </a:r>
           </a:p>
@@ -19586,7 +19539,7 @@
               <a:buFont typeface="Wingdings" panose="05000000000000000000" pitchFamily="2" charset="2"/>
               <a:buChar char="§"/>
             </a:pPr>
-            <a:endParaRPr lang="en-US" dirty="0" smtClean="0"/>
+            <a:endParaRPr lang="en-US" dirty="0"/>
           </a:p>
           <a:p>
             <a:pPr marL="457200" indent="-457200">
@@ -19601,7 +19554,7 @@
               <a:buChar char="§"/>
             </a:pPr>
             <a:r>
-              <a:rPr lang="en-US" dirty="0" smtClean="0"/>
+              <a:rPr lang="en-US" dirty="0"/>
               <a:t>or tuples as dictionary values</a:t>
             </a:r>
             <a:endParaRPr lang="bg-BG" dirty="0"/>
@@ -19653,42 +19606,37 @@
           <a:lstStyle/>
           <a:p>
             <a:r>
-              <a:rPr lang="en-US" dirty="0" err="1" smtClean="0"/>
+              <a:rPr lang="en-US" dirty="0" err="1"/>
               <a:t>students_and_grades</a:t>
             </a:r>
             <a:r>
-              <a:rPr lang="en-US" dirty="0" smtClean="0"/>
+              <a:rPr lang="en-US" dirty="0"/>
               <a:t> = {</a:t>
             </a:r>
           </a:p>
           <a:p>
             <a:r>
-              <a:rPr lang="en-US" dirty="0" smtClean="0"/>
+              <a:rPr lang="en-US" dirty="0"/>
               <a:t>    "peter": [4.50, 5.00, 4.95],</a:t>
             </a:r>
           </a:p>
           <a:p>
             <a:r>
               <a:rPr lang="en-US" dirty="0"/>
-              <a:t> </a:t>
-            </a:r>
-            <a:r>
-              <a:rPr lang="en-US" dirty="0" smtClean="0"/>
-              <a:t>   "</a:t>
-            </a:r>
-            <a:r>
-              <a:rPr lang="en-US" dirty="0" err="1" smtClean="0"/>
+              <a:t>    "</a:t>
+            </a:r>
+            <a:r>
+              <a:rPr lang="en-US" dirty="0" err="1"/>
               <a:t>anna</a:t>
             </a:r>
             <a:r>
-              <a:rPr lang="en-US" dirty="0" smtClean="0"/>
+              <a:rPr lang="en-US" dirty="0"/>
               <a:t>": [6.00, 5.65, 5.80]</a:t>
             </a:r>
-            <a:endParaRPr lang="en-US" dirty="0"/>
-          </a:p>
-          <a:p>
-            <a:r>
-              <a:rPr lang="en-US" dirty="0" smtClean="0"/>
+          </a:p>
+          <a:p>
+            <a:r>
+              <a:rPr lang="en-US" dirty="0"/>
               <a:t>}</a:t>
             </a:r>
             <a:endParaRPr lang="bg-BG" dirty="0"/>
@@ -19711,7 +19659,7 @@
           <a:lstStyle/>
           <a:p>
             <a:r>
-              <a:rPr lang="en-US" dirty="0" smtClean="0"/>
+              <a:rPr lang="en-US" dirty="0"/>
               <a:t>Nested Structures (2)</a:t>
             </a:r>
             <a:endParaRPr lang="bg-BG" dirty="0"/>
@@ -19952,40 +19900,39 @@
           </a:lstStyle>
           <a:p>
             <a:r>
-              <a:rPr lang="en-US" dirty="0" err="1" smtClean="0"/>
+              <a:rPr lang="en-US" dirty="0" err="1"/>
               <a:t>words_and_characters</a:t>
             </a:r>
             <a:r>
-              <a:rPr lang="en-US" dirty="0" smtClean="0"/>
+              <a:rPr lang="en-US" dirty="0"/>
               <a:t> = {</a:t>
             </a:r>
           </a:p>
           <a:p>
             <a:r>
-              <a:rPr lang="en-US" dirty="0" smtClean="0"/>
+              <a:rPr lang="en-US" dirty="0"/>
               <a:t>    "bob":  ("b", "o", "b"),</a:t>
             </a:r>
           </a:p>
           <a:p>
             <a:r>
-              <a:rPr lang="en-US" dirty="0" smtClean="0"/>
+              <a:rPr lang="en-US" dirty="0"/>
               <a:t>    "</a:t>
             </a:r>
             <a:r>
-              <a:rPr lang="en-US" dirty="0" err="1" smtClean="0"/>
+              <a:rPr lang="en-US" dirty="0" err="1"/>
               <a:t>anna</a:t>
             </a:r>
             <a:r>
-              <a:rPr lang="en-US" dirty="0" smtClean="0"/>
+              <a:rPr lang="en-US" dirty="0"/>
               <a:t>": ("a", "n", "n", "a")</a:t>
             </a:r>
           </a:p>
           <a:p>
             <a:r>
-              <a:rPr lang="en-US" dirty="0" smtClean="0"/>
+              <a:rPr lang="en-US" dirty="0"/>
               <a:t>}</a:t>
             </a:r>
-            <a:endParaRPr lang="en-US" dirty="0"/>
           </a:p>
         </p:txBody>
       </p:sp>
@@ -20514,13 +20461,6 @@
       <p:transition spd="slow" advClick="0" advTm="5000"/>
     </mc:Fallback>
   </mc:AlternateContent>
-  <p:timing>
-    <p:tnLst>
-      <p:par>
-        <p:cTn id="1" dur="indefinite" restart="never" nodeType="tmRoot"/>
-      </p:par>
-    </p:tnLst>
-  </p:timing>
 </p:sld>
 </file>
 
@@ -21738,13 +21678,6 @@
       <p:transition spd="slow" advClick="0" advTm="5000"/>
     </mc:Fallback>
   </mc:AlternateContent>
-  <p:timing>
-    <p:tnLst>
-      <p:par>
-        <p:cTn id="1" dur="indefinite" restart="never" nodeType="tmRoot"/>
-      </p:par>
-    </p:tnLst>
-  </p:timing>
 </p:sld>
 </file>
 
@@ -21891,13 +21824,6 @@
   <p:clrMapOvr>
     <a:masterClrMapping/>
   </p:clrMapOvr>
-  <p:timing>
-    <p:tnLst>
-      <p:par>
-        <p:cTn id="1" dur="indefinite" restart="never" nodeType="tmRoot"/>
-      </p:par>
-    </p:tnLst>
-  </p:timing>
 </p:sld>
 </file>
 
@@ -22525,13 +22451,6 @@
       <p:transition spd="slow" advClick="0" advTm="5000"/>
     </mc:Fallback>
   </mc:AlternateContent>
-  <p:timing>
-    <p:tnLst>
-      <p:par>
-        <p:cTn id="1" dur="indefinite" restart="never" nodeType="tmRoot"/>
-      </p:par>
-    </p:tnLst>
-  </p:timing>
 </p:sld>
 </file>
 
@@ -23507,13 +23426,6 @@
       <p:transition spd="slow" advClick="0" advTm="5000"/>
     </mc:Fallback>
   </mc:AlternateContent>
-  <p:timing>
-    <p:tnLst>
-      <p:par>
-        <p:cTn id="1" dur="indefinite" restart="never" nodeType="tmRoot"/>
-      </p:par>
-    </p:tnLst>
-  </p:timing>
 </p:sld>
 </file>
 
@@ -24565,13 +24477,6 @@
       <p:transition spd="slow" advClick="0" advTm="5000"/>
     </mc:Fallback>
   </mc:AlternateContent>
-  <p:timing>
-    <p:tnLst>
-      <p:par>
-        <p:cTn id="1" dur="indefinite" restart="never" nodeType="tmRoot"/>
-      </p:par>
-    </p:tnLst>
-  </p:timing>
 </p:sld>
 </file>
 
@@ -27632,18 +27537,18 @@
 </file>
 
 <file path=customXml/item2.xml><?xml version="1.0" encoding="utf-8"?>
-<p:properties xmlns:p="http://schemas.microsoft.com/office/2006/metadata/properties" xmlns:xsi="http://www.w3.org/2001/XMLSchema-instance" xmlns:pc="http://schemas.microsoft.com/office/infopath/2007/PartnerControls">
-  <documentManagement/>
-</p:properties>
-</file>
-
-<file path=customXml/item3.xml><?xml version="1.0" encoding="utf-8"?>
 <?mso-contentType ?>
 <FormTemplates xmlns="http://schemas.microsoft.com/sharepoint/v3/contenttype/forms">
   <Display>DocumentLibraryForm</Display>
   <Edit>DocumentLibraryForm</Edit>
   <New>DocumentLibraryForm</New>
 </FormTemplates>
+</file>
+
+<file path=customXml/item3.xml><?xml version="1.0" encoding="utf-8"?>
+<p:properties xmlns:p="http://schemas.microsoft.com/office/2006/metadata/properties" xmlns:xsi="http://www.w3.org/2001/XMLSchema-instance" xmlns:pc="http://schemas.microsoft.com/office/infopath/2007/PartnerControls">
+  <documentManagement/>
+</p:properties>
 </file>
 
 <file path=customXml/itemProps1.xml><?xml version="1.0" encoding="utf-8"?>
@@ -27665,25 +27570,18 @@
 </file>
 
 <file path=customXml/itemProps2.xml><?xml version="1.0" encoding="utf-8"?>
-<ds:datastoreItem xmlns:ds="http://schemas.openxmlformats.org/officeDocument/2006/customXml" ds:itemID="{620D820E-79FD-4E85-8B45-1A7863F24FD2}">
+<ds:datastoreItem xmlns:ds="http://schemas.openxmlformats.org/officeDocument/2006/customXml" ds:itemID="{B54C8BF6-F98D-4DB6-B174-7838483A269D}">
   <ds:schemaRefs>
-    <ds:schemaRef ds:uri="http://purl.org/dc/terms/"/>
-    <ds:schemaRef ds:uri="http://schemas.openxmlformats.org/package/2006/metadata/core-properties"/>
-    <ds:schemaRef ds:uri="http://purl.org/dc/dcmitype/"/>
-    <ds:schemaRef ds:uri="http://schemas.microsoft.com/office/infopath/2007/PartnerControls"/>
-    <ds:schemaRef ds:uri="http://purl.org/dc/elements/1.1/"/>
-    <ds:schemaRef ds:uri="http://schemas.microsoft.com/office/2006/metadata/properties"/>
-    <ds:schemaRef ds:uri="http://schemas.microsoft.com/office/2006/documentManagement/types"/>
-    <ds:schemaRef ds:uri="b1da4528-fe13-414f-b133-a49aeaaa47fa"/>
-    <ds:schemaRef ds:uri="http://www.w3.org/XML/1998/namespace"/>
+    <ds:schemaRef ds:uri="http://schemas.microsoft.com/sharepoint/v3/contenttype/forms"/>
   </ds:schemaRefs>
 </ds:datastoreItem>
 </file>
 
 <file path=customXml/itemProps3.xml><?xml version="1.0" encoding="utf-8"?>
-<ds:datastoreItem xmlns:ds="http://schemas.openxmlformats.org/officeDocument/2006/customXml" ds:itemID="{B54C8BF6-F98D-4DB6-B174-7838483A269D}">
+<ds:datastoreItem xmlns:ds="http://schemas.openxmlformats.org/officeDocument/2006/customXml" ds:itemID="{620D820E-79FD-4E85-8B45-1A7863F24FD2}">
   <ds:schemaRefs>
-    <ds:schemaRef ds:uri="http://schemas.microsoft.com/sharepoint/v3/contenttype/forms"/>
+    <ds:schemaRef ds:uri="http://schemas.microsoft.com/office/2006/metadata/properties"/>
+    <ds:schemaRef ds:uri="http://schemas.microsoft.com/office/infopath/2007/PartnerControls"/>
   </ds:schemaRefs>
 </ds:datastoreItem>
 </file>
</xml_diff>